<commit_message>
fixed new form bugs
</commit_message>
<xml_diff>
--- a/docs/template.pptx
+++ b/docs/template.pptx
@@ -199,7 +199,7 @@
           <a:p>
             <a:fld id="{498EBC27-3C92-DF40-81E2-50E2258292AA}" type="datetimeFigureOut">
               <a:rPr lang="zh-CN" altLang="en-US"/>
-              <a:t>2024/5/3</a:t>
+              <a:t>2025/2/19</a:t>
             </a:fld>
             <a:endParaRPr kumimoji="1" lang="zh-CN" altLang="en-US"/>
           </a:p>
@@ -1091,7 +1091,7 @@
           <a:p>
             <a:fld id="{3853FCE5-64A3-3F48-8FE4-AFF90259B521}" type="datetimeFigureOut">
               <a:rPr kumimoji="1" lang="zh-CN" altLang="en-US" smtClean="0"/>
-              <a:t>2024/5/3</a:t>
+              <a:t>2025/2/19</a:t>
             </a:fld>
             <a:endParaRPr kumimoji="1" lang="zh-CN" altLang="en-US"/>
           </a:p>
@@ -1261,7 +1261,7 @@
           <a:p>
             <a:fld id="{3853FCE5-64A3-3F48-8FE4-AFF90259B521}" type="datetimeFigureOut">
               <a:rPr kumimoji="1" lang="zh-CN" altLang="en-US" smtClean="0"/>
-              <a:t>2024/5/3</a:t>
+              <a:t>2025/2/19</a:t>
             </a:fld>
             <a:endParaRPr kumimoji="1" lang="zh-CN" altLang="en-US"/>
           </a:p>
@@ -1441,7 +1441,7 @@
           <a:p>
             <a:fld id="{3853FCE5-64A3-3F48-8FE4-AFF90259B521}" type="datetimeFigureOut">
               <a:rPr kumimoji="1" lang="zh-CN" altLang="en-US" smtClean="0"/>
-              <a:t>2024/5/3</a:t>
+              <a:t>2025/2/19</a:t>
             </a:fld>
             <a:endParaRPr kumimoji="1" lang="zh-CN" altLang="en-US"/>
           </a:p>
@@ -1611,7 +1611,7 @@
           <a:p>
             <a:fld id="{3853FCE5-64A3-3F48-8FE4-AFF90259B521}" type="datetimeFigureOut">
               <a:rPr kumimoji="1" lang="zh-CN" altLang="en-US" smtClean="0"/>
-              <a:t>2024/5/3</a:t>
+              <a:t>2025/2/19</a:t>
             </a:fld>
             <a:endParaRPr kumimoji="1" lang="zh-CN" altLang="en-US"/>
           </a:p>
@@ -1855,7 +1855,7 @@
           <a:p>
             <a:fld id="{3853FCE5-64A3-3F48-8FE4-AFF90259B521}" type="datetimeFigureOut">
               <a:rPr kumimoji="1" lang="zh-CN" altLang="en-US" smtClean="0"/>
-              <a:t>2024/5/3</a:t>
+              <a:t>2025/2/19</a:t>
             </a:fld>
             <a:endParaRPr kumimoji="1" lang="zh-CN" altLang="en-US"/>
           </a:p>
@@ -2087,7 +2087,7 @@
           <a:p>
             <a:fld id="{3853FCE5-64A3-3F48-8FE4-AFF90259B521}" type="datetimeFigureOut">
               <a:rPr kumimoji="1" lang="zh-CN" altLang="en-US" smtClean="0"/>
-              <a:t>2024/5/3</a:t>
+              <a:t>2025/2/19</a:t>
             </a:fld>
             <a:endParaRPr kumimoji="1" lang="zh-CN" altLang="en-US"/>
           </a:p>
@@ -2454,7 +2454,7 @@
           <a:p>
             <a:fld id="{3853FCE5-64A3-3F48-8FE4-AFF90259B521}" type="datetimeFigureOut">
               <a:rPr kumimoji="1" lang="zh-CN" altLang="en-US" smtClean="0"/>
-              <a:t>2024/5/3</a:t>
+              <a:t>2025/2/19</a:t>
             </a:fld>
             <a:endParaRPr kumimoji="1" lang="zh-CN" altLang="en-US"/>
           </a:p>
@@ -2572,7 +2572,7 @@
           <a:p>
             <a:fld id="{3853FCE5-64A3-3F48-8FE4-AFF90259B521}" type="datetimeFigureOut">
               <a:rPr kumimoji="1" lang="zh-CN" altLang="en-US" smtClean="0"/>
-              <a:t>2024/5/3</a:t>
+              <a:t>2025/2/19</a:t>
             </a:fld>
             <a:endParaRPr kumimoji="1" lang="zh-CN" altLang="en-US"/>
           </a:p>
@@ -2667,7 +2667,7 @@
           <a:p>
             <a:fld id="{3853FCE5-64A3-3F48-8FE4-AFF90259B521}" type="datetimeFigureOut">
               <a:rPr kumimoji="1" lang="zh-CN" altLang="en-US" smtClean="0"/>
-              <a:t>2024/5/3</a:t>
+              <a:t>2025/2/19</a:t>
             </a:fld>
             <a:endParaRPr kumimoji="1" lang="zh-CN" altLang="en-US"/>
           </a:p>
@@ -2944,7 +2944,7 @@
           <a:p>
             <a:fld id="{3853FCE5-64A3-3F48-8FE4-AFF90259B521}" type="datetimeFigureOut">
               <a:rPr kumimoji="1" lang="zh-CN" altLang="en-US" smtClean="0"/>
-              <a:t>2024/5/3</a:t>
+              <a:t>2025/2/19</a:t>
             </a:fld>
             <a:endParaRPr kumimoji="1" lang="zh-CN" altLang="en-US"/>
           </a:p>
@@ -3201,7 +3201,7 @@
           <a:p>
             <a:fld id="{3853FCE5-64A3-3F48-8FE4-AFF90259B521}" type="datetimeFigureOut">
               <a:rPr kumimoji="1" lang="zh-CN" altLang="en-US" smtClean="0"/>
-              <a:t>2024/5/3</a:t>
+              <a:t>2025/2/19</a:t>
             </a:fld>
             <a:endParaRPr kumimoji="1" lang="zh-CN" altLang="en-US"/>
           </a:p>
@@ -3423,7 +3423,7 @@
           <a:p>
             <a:fld id="{3853FCE5-64A3-3F48-8FE4-AFF90259B521}" type="datetimeFigureOut">
               <a:rPr kumimoji="1" lang="zh-CN" altLang="en-US" smtClean="0"/>
-              <a:t>2024/5/3</a:t>
+              <a:t>2025/2/19</a:t>
             </a:fld>
             <a:endParaRPr kumimoji="1" lang="zh-CN" altLang="en-US"/>
           </a:p>
@@ -4167,10 +4167,10 @@
       </p:grpSpPr>
       <p:pic>
         <p:nvPicPr>
-          <p:cNvPr id="4" name="图片 3">
+          <p:cNvPr id="3" name="图片 2">
             <a:extLst>
               <a:ext uri="{FF2B5EF4-FFF2-40B4-BE49-F238E27FC236}">
-                <a16:creationId xmlns:a16="http://schemas.microsoft.com/office/drawing/2014/main" id="{77306820-28B9-787E-1B05-D31CC74AEC03}"/>
+                <a16:creationId xmlns:a16="http://schemas.microsoft.com/office/drawing/2014/main" id="{80CA28AB-B0E4-A883-949B-BAF2FE253283}"/>
               </a:ext>
             </a:extLst>
           </p:cNvPr>

</xml_diff>